<commit_message>
add more viz scripts starting point
</commit_message>
<xml_diff>
--- a/Lessons/C_R_practice_Viz_MoreEDA/B_Viz_basics.pptx
+++ b/Lessons/C_R_practice_Viz_MoreEDA/B_Viz_basics.pptx
@@ -4466,6 +4466,49 @@
           </a:extLst>
         </p:spPr>
       </p:pic>
+      <p:sp>
+        <p:nvSpPr>
+          <p:cNvPr id="7" name="TextBox 6">
+            <a:extLst>
+              <a:ext uri="{FF2B5EF4-FFF2-40B4-BE49-F238E27FC236}">
+                <a16:creationId xmlns:a16="http://schemas.microsoft.com/office/drawing/2014/main" id="{1DDAB1D5-7490-AA5C-28E4-322EC59C8807}"/>
+              </a:ext>
+            </a:extLst>
+          </p:cNvPr>
+          <p:cNvSpPr txBox="1"/>
+          <p:nvPr/>
+        </p:nvSpPr>
+        <p:spPr>
+          <a:xfrm>
+            <a:off x="1506682" y="1673944"/>
+            <a:ext cx="4572000" cy="369332"/>
+          </a:xfrm>
+          <a:prstGeom prst="rect">
+            <a:avLst/>
+          </a:prstGeom>
+          <a:noFill/>
+        </p:spPr>
+        <p:txBody>
+          <a:bodyPr wrap="square">
+            <a:spAutoFit/>
+          </a:bodyPr>
+          <a:lstStyle/>
+          <a:p>
+            <a:r>
+              <a:rPr lang="en-US" dirty="0"/>
+              <a:t>https://r-</a:t>
+            </a:r>
+            <a:r>
+              <a:rPr lang="en-US" dirty="0" err="1"/>
+              <a:t>graphics.org</a:t>
+            </a:r>
+            <a:r>
+              <a:rPr lang="en-US" dirty="0"/>
+              <a:t>/</a:t>
+            </a:r>
+          </a:p>
+        </p:txBody>
+      </p:sp>
     </p:spTree>
     <p:extLst>
       <p:ext uri="{BB962C8B-B14F-4D97-AF65-F5344CB8AC3E}">
@@ -4980,7 +5023,13 @@
           <p:cNvGraphicFramePr>
             <a:graphicFrameLocks noGrp="1"/>
           </p:cNvGraphicFramePr>
-          <p:nvPr/>
+          <p:nvPr>
+            <p:extLst>
+              <p:ext uri="{D42A27DB-BD31-4B8C-83A1-F6EECF244321}">
+                <p14:modId xmlns:p14="http://schemas.microsoft.com/office/powerpoint/2010/main" val="116825943"/>
+              </p:ext>
+            </p:extLst>
+          </p:nvPr>
         </p:nvGraphicFramePr>
         <p:xfrm>
           <a:off x="971867" y="2558964"/>
@@ -5018,7 +5067,7 @@
                         <a:rPr lang="en-US" dirty="0">
                           <a:latin typeface="Arial Unicode MS" panose="020B0604020202020204" pitchFamily="34" charset="-128"/>
                         </a:rPr>
-                        <a:t>word</a:t>
+                        <a:t>Variable</a:t>
                       </a:r>
                     </a:p>
                   </a:txBody>
@@ -5058,7 +5107,7 @@
                         <a:rPr lang="en-US" dirty="0">
                           <a:latin typeface="Arial Unicode MS" panose="020B0604020202020204" pitchFamily="34" charset="-128"/>
                         </a:rPr>
-                        <a:t>Term1</a:t>
+                        <a:t>Grp1</a:t>
                       </a:r>
                     </a:p>
                   </a:txBody>
@@ -5095,7 +5144,7 @@
                         <a:rPr lang="en-US" dirty="0">
                           <a:latin typeface="Arial Unicode MS" panose="020B0604020202020204" pitchFamily="34" charset="-128"/>
                         </a:rPr>
-                        <a:t>Term2</a:t>
+                        <a:t>Grp2</a:t>
                       </a:r>
                     </a:p>
                   </a:txBody>
@@ -5132,7 +5181,7 @@
                         <a:rPr lang="en-US" dirty="0">
                           <a:latin typeface="Arial Unicode MS" panose="020B0604020202020204" pitchFamily="34" charset="-128"/>
                         </a:rPr>
-                        <a:t>Term3</a:t>
+                        <a:t>Grp3</a:t>
                       </a:r>
                     </a:p>
                   </a:txBody>
@@ -5206,7 +5255,7 @@
                         <a:rPr lang="en-US" dirty="0" err="1">
                           <a:latin typeface="Arial Unicode MS" panose="020B0604020202020204" pitchFamily="34" charset="-128"/>
                         </a:rPr>
-                        <a:t>Term_n</a:t>
+                        <a:t>Grp_n</a:t>
                       </a:r>
                       <a:endParaRPr lang="en-US" dirty="0">
                         <a:latin typeface="Arial Unicode MS" panose="020B0604020202020204" pitchFamily="34" charset="-128"/>

</xml_diff>